<commit_message>
Update pres - Gestion moteur
</commit_message>
<xml_diff>
--- a/docs/presentations/final/Présentation_projet_ECU.pptx
+++ b/docs/presentations/final/Présentation_projet_ECU.pptx
@@ -6,7 +6,7 @@
     <p:sldMasterId id="2147483661" r:id="rId2"/>
   </p:sldMasterIdLst>
   <p:notesMasterIdLst>
-    <p:notesMasterId r:id="rId19"/>
+    <p:notesMasterId r:id="rId20"/>
   </p:notesMasterIdLst>
   <p:sldIdLst>
     <p:sldId id="256" r:id="rId3"/>
@@ -23,8 +23,9 @@
     <p:sldId id="270" r:id="rId14"/>
     <p:sldId id="271" r:id="rId15"/>
     <p:sldId id="266" r:id="rId16"/>
-    <p:sldId id="267" r:id="rId17"/>
-    <p:sldId id="268" r:id="rId18"/>
+    <p:sldId id="274" r:id="rId17"/>
+    <p:sldId id="267" r:id="rId18"/>
+    <p:sldId id="268" r:id="rId19"/>
   </p:sldIdLst>
   <p:sldSz cx="12192000" cy="6858000"/>
   <p:notesSz cx="6858000" cy="9144000"/>
@@ -1346,160 +1347,40 @@
               <a:buNone/>
             </a:pPr>
             <a:r>
-              <a:rPr lang="fr-FR" sz="2000" b="0" strike="noStrike" spc="-1">
+              <a:rPr lang="fr-FR" sz="2000" b="0" strike="noStrike" spc="-1" dirty="0" err="1">
                 <a:latin typeface="Arial"/>
               </a:rPr>
-              <a:t>Description de l'interface utilisateur (GUI) programmée :</a:t>
+              <a:t>TunerStudio</a:t>
             </a:r>
-          </a:p>
-          <a:p>
-            <a:pPr marL="216000" indent="-216000">
-              <a:lnSpc>
-                <a:spcPct val="100000"/>
-              </a:lnSpc>
-              <a:buNone/>
-            </a:pPr>
-            <a:endParaRPr lang="fr-FR" sz="2000" b="0" strike="noStrike" spc="-1">
-              <a:latin typeface="Arial"/>
-            </a:endParaRPr>
-          </a:p>
-          <a:p>
-            <a:pPr marL="216000" indent="-216000">
-              <a:lnSpc>
-                <a:spcPct val="100000"/>
-              </a:lnSpc>
-              <a:buNone/>
-            </a:pPr>
             <a:r>
-              <a:rPr lang="fr-FR" sz="2000" b="0" strike="noStrike" spc="-1">
+              <a:rPr lang="fr-FR" sz="2000" b="0" strike="noStrike" spc="-1" dirty="0">
                 <a:latin typeface="Arial"/>
               </a:rPr>
-              <a:t>1. **Langage de Programmation :** L'interface a été développée en utilisant Python, tirant parti de sa flexibilité et de sa simplicité de mise en œuvre.</a:t>
+              <a:t> est un logiciel utilisé pour la configuration et le réglage des systèmes de gestion moteur (ECU) sur les véhicules équipés de moteurs programmables. Il est particulièrement populaire parmi les amateurs de voitures personnalisées et les passionnés de performances automobiles. </a:t>
             </a:r>
-          </a:p>
-          <a:p>
-            <a:pPr marL="216000" indent="-216000">
-              <a:lnSpc>
-                <a:spcPct val="100000"/>
-              </a:lnSpc>
-              <a:buNone/>
-            </a:pPr>
-            <a:endParaRPr lang="fr-FR" sz="2000" b="0" strike="noStrike" spc="-1">
-              <a:latin typeface="Arial"/>
-            </a:endParaRPr>
-          </a:p>
-          <a:p>
-            <a:pPr marL="216000" indent="-216000">
-              <a:lnSpc>
-                <a:spcPct val="100000"/>
-              </a:lnSpc>
-              <a:buNone/>
-            </a:pPr>
             <a:r>
-              <a:rPr lang="fr-FR" sz="2000" b="0" strike="noStrike" spc="-1">
+              <a:rPr lang="fr-FR" sz="2000" b="0" strike="noStrike" spc="-1" dirty="0" err="1">
                 <a:latin typeface="Arial"/>
               </a:rPr>
-              <a:t>2. **Bibliothèque Graphique :** Pour la création de l'interface graphique, nous avons opté pour tkinter, une bibliothèque intégrée à Python, reconnue pour sa facilité d'utilisation et son efficacité dans la conception d'interfaces utilisateur.</a:t>
+              <a:t>TunerStudio</a:t>
             </a:r>
-          </a:p>
-          <a:p>
-            <a:pPr marL="216000" indent="-216000">
-              <a:lnSpc>
-                <a:spcPct val="100000"/>
-              </a:lnSpc>
-              <a:buNone/>
-            </a:pPr>
-            <a:endParaRPr lang="fr-FR" sz="2000" b="0" strike="noStrike" spc="-1">
-              <a:latin typeface="Arial"/>
-            </a:endParaRPr>
-          </a:p>
-          <a:p>
-            <a:pPr marL="216000" indent="-216000">
-              <a:lnSpc>
-                <a:spcPct val="100000"/>
-              </a:lnSpc>
-              <a:buNone/>
-            </a:pPr>
             <a:r>
-              <a:rPr lang="fr-FR" sz="2000" b="0" strike="noStrike" spc="-1">
+              <a:rPr lang="fr-FR" sz="2000" b="0" strike="noStrike" spc="-1" dirty="0">
                 <a:latin typeface="Arial"/>
               </a:rPr>
-              <a:t>3. **Architecture Modèle-Contrôleur-Vue (MCV) :** La structure de l'interface suit le modèle MCV, séparant clairement la logique métier (Modèle), le traitement des données (Contrôleur) et la représentation graphique (Vue). Cette approche favorise la maintenabilité et l'évolutivité du code.</a:t>
+              <a:t> permet aux utilisateurs de modifier les paramètres du moteur tels que l'avance à l'allumage, le temps d'injection de carburant, le rapport air-carburant, etc., afin d'optimiser les performances du moteur en fonction de diverses conditions de conduite. Ce logiciel est souvent utilisé en conjonction avec des interfaces matérielles telles que </a:t>
             </a:r>
-          </a:p>
-          <a:p>
-            <a:pPr marL="216000" indent="-216000">
-              <a:lnSpc>
-                <a:spcPct val="100000"/>
-              </a:lnSpc>
-              <a:buNone/>
-            </a:pPr>
-            <a:endParaRPr lang="fr-FR" sz="2000" b="0" strike="noStrike" spc="-1">
-              <a:latin typeface="Arial"/>
-            </a:endParaRPr>
-          </a:p>
-          <a:p>
-            <a:pPr marL="216000" indent="-216000">
-              <a:lnSpc>
-                <a:spcPct val="100000"/>
-              </a:lnSpc>
-              <a:buNone/>
-            </a:pPr>
             <a:r>
-              <a:rPr lang="fr-FR" sz="2000" b="0" strike="noStrike" spc="-1">
+              <a:rPr lang="fr-FR" sz="2000" b="0" strike="noStrike" spc="-1" dirty="0" err="1">
                 <a:latin typeface="Arial"/>
               </a:rPr>
-              <a:t>4. **Utilisation de Design Patterns :** Dans le cadre du développement, nous avons intégré des motifs de conception (design patterns) afin d'optimiser la réutilisabilité du code, d'améliorer la lisibilité et de simplifier la maintenance.</a:t>
+              <a:t>MegaSquirt</a:t>
             </a:r>
-          </a:p>
-          <a:p>
-            <a:pPr marL="216000" indent="-216000">
-              <a:lnSpc>
-                <a:spcPct val="100000"/>
-              </a:lnSpc>
-              <a:buNone/>
-            </a:pPr>
-            <a:endParaRPr lang="fr-FR" sz="2000" b="0" strike="noStrike" spc="-1">
-              <a:latin typeface="Arial"/>
-            </a:endParaRPr>
-          </a:p>
-          <a:p>
-            <a:pPr marL="216000" indent="-216000">
-              <a:lnSpc>
-                <a:spcPct val="100000"/>
-              </a:lnSpc>
-              <a:buNone/>
-            </a:pPr>
             <a:r>
-              <a:rPr lang="fr-FR" sz="2000" b="0" strike="noStrike" spc="-1">
+              <a:rPr lang="fr-FR" sz="2000" b="0" strike="noStrike" spc="-1" dirty="0">
                 <a:latin typeface="Arial"/>
               </a:rPr>
-              <a:t>5. **Démonstration :** Pour illustrer les fonctionnalités de l'interface, une démonstration sera présentée, mettant en avant la convivialité de la conception, la fluidité des interactions et la clarté des informations affichées.</a:t>
-            </a:r>
-          </a:p>
-          <a:p>
-            <a:pPr marL="216000" indent="-216000">
-              <a:lnSpc>
-                <a:spcPct val="100000"/>
-              </a:lnSpc>
-              <a:buNone/>
-            </a:pPr>
-            <a:endParaRPr lang="fr-FR" sz="2000" b="0" strike="noStrike" spc="-1">
-              <a:latin typeface="Arial"/>
-            </a:endParaRPr>
-          </a:p>
-          <a:p>
-            <a:pPr marL="216000" indent="-216000">
-              <a:lnSpc>
-                <a:spcPct val="100000"/>
-              </a:lnSpc>
-              <a:buNone/>
-            </a:pPr>
-            <a:r>
-              <a:rPr lang="fr-FR" sz="2000" b="0" strike="noStrike" spc="-1">
-                <a:latin typeface="Arial"/>
-              </a:rPr>
-              <a:t>Ces choix techniques et conceptuels visent à garantir une expérience utilisateur optimale tout en assurant la robustesse et la flexibilité du système.</a:t>
+              <a:t> ou d'autres systèmes de gestion moteur programmables.</a:t>
             </a:r>
           </a:p>
         </p:txBody>
@@ -21549,70 +21430,6 @@
           </a:p>
         </p:txBody>
       </p:sp>
-      <p:sp>
-        <p:nvSpPr>
-          <p:cNvPr id="2" name="ZoneTexte 9">
-            <a:extLst>
-              <a:ext uri="{FF2B5EF4-FFF2-40B4-BE49-F238E27FC236}">
-                <a16:creationId xmlns:a16="http://schemas.microsoft.com/office/drawing/2014/main" id="{A32E4649-CDA9-3B36-0FF8-3AB52047C3FA}"/>
-              </a:ext>
-            </a:extLst>
-          </p:cNvPr>
-          <p:cNvSpPr/>
-          <p:nvPr/>
-        </p:nvSpPr>
-        <p:spPr>
-          <a:xfrm>
-            <a:off x="4161539" y="3137339"/>
-            <a:ext cx="1953525" cy="583321"/>
-          </a:xfrm>
-          <a:prstGeom prst="rect">
-            <a:avLst/>
-          </a:prstGeom>
-          <a:noFill/>
-          <a:ln w="0">
-            <a:noFill/>
-          </a:ln>
-        </p:spPr>
-        <p:style>
-          <a:lnRef idx="0">
-            <a:scrgbClr r="0" g="0" b="0"/>
-          </a:lnRef>
-          <a:fillRef idx="0">
-            <a:scrgbClr r="0" g="0" b="0"/>
-          </a:fillRef>
-          <a:effectRef idx="0">
-            <a:scrgbClr r="0" g="0" b="0"/>
-          </a:effectRef>
-          <a:fontRef idx="minor"/>
-        </p:style>
-        <p:txBody>
-          <a:bodyPr wrap="none" lIns="90000" tIns="45000" rIns="90000" bIns="45000" anchor="t">
-            <a:spAutoFit/>
-          </a:bodyPr>
-          <a:lstStyle/>
-          <a:p>
-            <a:pPr>
-              <a:lnSpc>
-                <a:spcPct val="100000"/>
-              </a:lnSpc>
-              <a:buNone/>
-            </a:pPr>
-            <a:r>
-              <a:rPr lang="fr-FR" sz="3200" spc="-1" dirty="0" err="1">
-                <a:solidFill>
-                  <a:srgbClr val="005E6A"/>
-                </a:solidFill>
-                <a:latin typeface="Calibri"/>
-              </a:rPr>
-              <a:t>Speeduino</a:t>
-            </a:r>
-            <a:endParaRPr lang="fr-FR" sz="3200" b="0" strike="noStrike" spc="-1" dirty="0">
-              <a:latin typeface="Arial"/>
-            </a:endParaRPr>
-          </a:p>
-        </p:txBody>
-      </p:sp>
       <p:pic>
         <p:nvPicPr>
           <p:cNvPr id="3" name="Image 2" descr="Une image contenant Police, logo, Graphique, symbole&#10;&#10;Description générée automatiquement">
@@ -21641,8 +21458,330 @@
         </p:blipFill>
         <p:spPr>
           <a:xfrm>
-            <a:off x="8716918" y="1980302"/>
+            <a:off x="7427785" y="1215210"/>
             <a:ext cx="3091439" cy="1068246"/>
+          </a:xfrm>
+          <a:prstGeom prst="rect">
+            <a:avLst/>
+          </a:prstGeom>
+        </p:spPr>
+      </p:pic>
+      <p:pic>
+        <p:nvPicPr>
+          <p:cNvPr id="4" name="Image 3" descr="Une image contenant Police, logo, Graphique, blanc&#10;&#10;Description générée automatiquement">
+            <a:extLst>
+              <a:ext uri="{FF2B5EF4-FFF2-40B4-BE49-F238E27FC236}">
+                <a16:creationId xmlns:a16="http://schemas.microsoft.com/office/drawing/2014/main" id="{B42BBC69-07E1-7533-228D-2FE94B5CEE60}"/>
+              </a:ext>
+            </a:extLst>
+          </p:cNvPr>
+          <p:cNvPicPr>
+            <a:picLocks noChangeAspect="1"/>
+          </p:cNvPicPr>
+          <p:nvPr/>
+        </p:nvPicPr>
+        <p:blipFill rotWithShape="1">
+          <a:blip r:embed="rId3">
+            <a:extLst>
+              <a:ext uri="{28A0092B-C50C-407E-A947-70E740481C1C}">
+                <a14:useLocalDpi xmlns:a14="http://schemas.microsoft.com/office/drawing/2010/main" val="0"/>
+              </a:ext>
+            </a:extLst>
+          </a:blip>
+          <a:srcRect t="35434" b="36228"/>
+          <a:stretch/>
+        </p:blipFill>
+        <p:spPr>
+          <a:xfrm>
+            <a:off x="1007750" y="1646922"/>
+            <a:ext cx="3366374" cy="715475"/>
+          </a:xfrm>
+          <a:prstGeom prst="rect">
+            <a:avLst/>
+          </a:prstGeom>
+        </p:spPr>
+      </p:pic>
+      <p:pic>
+        <p:nvPicPr>
+          <p:cNvPr id="6" name="Image 5" descr="Une image contenant texte, capture d’écran, Police, document&#10;&#10;Description générée automatiquement">
+            <a:extLst>
+              <a:ext uri="{FF2B5EF4-FFF2-40B4-BE49-F238E27FC236}">
+                <a16:creationId xmlns:a16="http://schemas.microsoft.com/office/drawing/2014/main" id="{23601040-F9D4-E4A8-C9B6-C1ED9BDDA0EA}"/>
+              </a:ext>
+            </a:extLst>
+          </p:cNvPr>
+          <p:cNvPicPr>
+            <a:picLocks noChangeAspect="1"/>
+          </p:cNvPicPr>
+          <p:nvPr/>
+        </p:nvPicPr>
+        <p:blipFill rotWithShape="1">
+          <a:blip r:embed="rId4">
+            <a:extLst>
+              <a:ext uri="{28A0092B-C50C-407E-A947-70E740481C1C}">
+                <a14:useLocalDpi xmlns:a14="http://schemas.microsoft.com/office/drawing/2010/main" val="0"/>
+              </a:ext>
+            </a:extLst>
+          </a:blip>
+          <a:srcRect t="-1" b="53716"/>
+          <a:stretch/>
+        </p:blipFill>
+        <p:spPr>
+          <a:xfrm>
+            <a:off x="326617" y="3026782"/>
+            <a:ext cx="1362265" cy="2892484"/>
+          </a:xfrm>
+          <a:prstGeom prst="rect">
+            <a:avLst/>
+          </a:prstGeom>
+        </p:spPr>
+      </p:pic>
+      <p:pic>
+        <p:nvPicPr>
+          <p:cNvPr id="8" name="Image 7" descr="Une image contenant texte, ligne, capture d’écran&#10;&#10;Description générée automatiquement">
+            <a:extLst>
+              <a:ext uri="{FF2B5EF4-FFF2-40B4-BE49-F238E27FC236}">
+                <a16:creationId xmlns:a16="http://schemas.microsoft.com/office/drawing/2014/main" id="{3E489915-5305-A90E-6428-06F09CE03087}"/>
+              </a:ext>
+            </a:extLst>
+          </p:cNvPr>
+          <p:cNvPicPr>
+            <a:picLocks noChangeAspect="1"/>
+          </p:cNvPicPr>
+          <p:nvPr/>
+        </p:nvPicPr>
+        <p:blipFill rotWithShape="1">
+          <a:blip r:embed="rId5">
+            <a:extLst>
+              <a:ext uri="{28A0092B-C50C-407E-A947-70E740481C1C}">
+                <a14:useLocalDpi xmlns:a14="http://schemas.microsoft.com/office/drawing/2010/main" val="0"/>
+              </a:ext>
+            </a:extLst>
+          </a:blip>
+          <a:srcRect t="1" b="57824"/>
+          <a:stretch/>
+        </p:blipFill>
+        <p:spPr>
+          <a:xfrm>
+            <a:off x="6839018" y="2846218"/>
+            <a:ext cx="1370039" cy="3073048"/>
+          </a:xfrm>
+          <a:prstGeom prst="rect">
+            <a:avLst/>
+          </a:prstGeom>
+        </p:spPr>
+      </p:pic>
+      <p:sp>
+        <p:nvSpPr>
+          <p:cNvPr id="9" name="ZoneTexte 22">
+            <a:extLst>
+              <a:ext uri="{FF2B5EF4-FFF2-40B4-BE49-F238E27FC236}">
+                <a16:creationId xmlns:a16="http://schemas.microsoft.com/office/drawing/2014/main" id="{570C15FD-5F17-01AC-4B2B-951F169F1D73}"/>
+              </a:ext>
+            </a:extLst>
+          </p:cNvPr>
+          <p:cNvSpPr/>
+          <p:nvPr/>
+        </p:nvSpPr>
+        <p:spPr>
+          <a:xfrm>
+            <a:off x="1416060" y="2517977"/>
+            <a:ext cx="2676894" cy="367878"/>
+          </a:xfrm>
+          <a:prstGeom prst="rect">
+            <a:avLst/>
+          </a:prstGeom>
+          <a:noFill/>
+          <a:ln w="0">
+            <a:noFill/>
+          </a:ln>
+        </p:spPr>
+        <p:style>
+          <a:lnRef idx="0">
+            <a:scrgbClr r="0" g="0" b="0"/>
+          </a:lnRef>
+          <a:fillRef idx="0">
+            <a:scrgbClr r="0" g="0" b="0"/>
+          </a:fillRef>
+          <a:effectRef idx="0">
+            <a:scrgbClr r="0" g="0" b="0"/>
+          </a:effectRef>
+          <a:fontRef idx="minor"/>
+        </p:style>
+        <p:txBody>
+          <a:bodyPr wrap="square" lIns="90000" tIns="45000" rIns="90000" bIns="45000" anchor="t">
+            <a:spAutoFit/>
+          </a:bodyPr>
+          <a:lstStyle/>
+          <a:p>
+            <a:pPr marL="285840" indent="-285840">
+              <a:lnSpc>
+                <a:spcPct val="100000"/>
+              </a:lnSpc>
+              <a:buClr>
+                <a:srgbClr val="005E6A"/>
+              </a:buClr>
+              <a:buFont typeface="Arial"/>
+              <a:buChar char="•"/>
+            </a:pPr>
+            <a:r>
+              <a:rPr lang="fr-FR" sz="1800" b="1" strike="noStrike" spc="-1" dirty="0">
+                <a:solidFill>
+                  <a:srgbClr val="005E6A"/>
+                </a:solidFill>
+                <a:latin typeface="Calibri"/>
+              </a:rPr>
+              <a:t>26 fichiers de codes</a:t>
+            </a:r>
+            <a:endParaRPr lang="fr-FR" sz="1800" b="0" strike="noStrike" spc="-1" dirty="0">
+              <a:latin typeface="Arial"/>
+            </a:endParaRPr>
+          </a:p>
+        </p:txBody>
+      </p:sp>
+      <p:sp>
+        <p:nvSpPr>
+          <p:cNvPr id="10" name="ZoneTexte 22">
+            <a:extLst>
+              <a:ext uri="{FF2B5EF4-FFF2-40B4-BE49-F238E27FC236}">
+                <a16:creationId xmlns:a16="http://schemas.microsoft.com/office/drawing/2014/main" id="{503356A4-708F-9EC2-BA7F-E7E5F6934CA3}"/>
+              </a:ext>
+            </a:extLst>
+          </p:cNvPr>
+          <p:cNvSpPr/>
+          <p:nvPr/>
+        </p:nvSpPr>
+        <p:spPr>
+          <a:xfrm>
+            <a:off x="7850953" y="2334038"/>
+            <a:ext cx="2437607" cy="367878"/>
+          </a:xfrm>
+          <a:prstGeom prst="rect">
+            <a:avLst/>
+          </a:prstGeom>
+          <a:noFill/>
+          <a:ln w="0">
+            <a:noFill/>
+          </a:ln>
+        </p:spPr>
+        <p:style>
+          <a:lnRef idx="0">
+            <a:scrgbClr r="0" g="0" b="0"/>
+          </a:lnRef>
+          <a:fillRef idx="0">
+            <a:scrgbClr r="0" g="0" b="0"/>
+          </a:fillRef>
+          <a:effectRef idx="0">
+            <a:scrgbClr r="0" g="0" b="0"/>
+          </a:effectRef>
+          <a:fontRef idx="minor"/>
+        </p:style>
+        <p:txBody>
+          <a:bodyPr wrap="square" lIns="90000" tIns="45000" rIns="90000" bIns="45000" anchor="t">
+            <a:spAutoFit/>
+          </a:bodyPr>
+          <a:lstStyle/>
+          <a:p>
+            <a:pPr marL="285840" indent="-285840">
+              <a:lnSpc>
+                <a:spcPct val="100000"/>
+              </a:lnSpc>
+              <a:buClr>
+                <a:srgbClr val="005E6A"/>
+              </a:buClr>
+              <a:buFont typeface="Arial"/>
+              <a:buChar char="•"/>
+            </a:pPr>
+            <a:r>
+              <a:rPr lang="fr-FR" b="1" spc="-1" dirty="0">
+                <a:solidFill>
+                  <a:srgbClr val="005E6A"/>
+                </a:solidFill>
+                <a:latin typeface="Calibri"/>
+              </a:rPr>
+              <a:t>88 fichiers de</a:t>
+            </a:r>
+            <a:r>
+              <a:rPr lang="fr-FR" sz="1800" b="1" strike="noStrike" spc="-1" dirty="0">
+                <a:solidFill>
+                  <a:srgbClr val="005E6A"/>
+                </a:solidFill>
+                <a:latin typeface="Calibri"/>
+              </a:rPr>
+              <a:t> codes</a:t>
+            </a:r>
+            <a:endParaRPr lang="fr-FR" sz="1800" b="0" strike="noStrike" spc="-1" dirty="0">
+              <a:latin typeface="Arial"/>
+            </a:endParaRPr>
+          </a:p>
+        </p:txBody>
+      </p:sp>
+      <p:pic>
+        <p:nvPicPr>
+          <p:cNvPr id="13" name="Image 12" descr="Une image contenant Appareils électroniques, Ingénierie électronique, Composant de circuit, Composant électronique&#10;&#10;Description générée automatiquement">
+            <a:extLst>
+              <a:ext uri="{FF2B5EF4-FFF2-40B4-BE49-F238E27FC236}">
+                <a16:creationId xmlns:a16="http://schemas.microsoft.com/office/drawing/2014/main" id="{F77C386A-636B-7776-1C60-AB4F17DEB1CA}"/>
+              </a:ext>
+            </a:extLst>
+          </p:cNvPr>
+          <p:cNvPicPr>
+            <a:picLocks noChangeAspect="1"/>
+          </p:cNvPicPr>
+          <p:nvPr/>
+        </p:nvPicPr>
+        <p:blipFill>
+          <a:blip r:embed="rId6">
+            <a:extLst>
+              <a:ext uri="{28A0092B-C50C-407E-A947-70E740481C1C}">
+                <a14:useLocalDpi xmlns:a14="http://schemas.microsoft.com/office/drawing/2010/main" val="0"/>
+              </a:ext>
+            </a:extLst>
+          </a:blip>
+          <a:stretch>
+            <a:fillRect/>
+          </a:stretch>
+        </p:blipFill>
+        <p:spPr>
+          <a:xfrm>
+            <a:off x="1821231" y="3110322"/>
+            <a:ext cx="4297800" cy="2544839"/>
+          </a:xfrm>
+          <a:prstGeom prst="rect">
+            <a:avLst/>
+          </a:prstGeom>
+        </p:spPr>
+      </p:pic>
+      <p:pic>
+        <p:nvPicPr>
+          <p:cNvPr id="15" name="Image 14" descr="Une image contenant Appareils électroniques, circuit, Composant électronique, Composant de circuit&#10;&#10;Description générée automatiquement">
+            <a:extLst>
+              <a:ext uri="{FF2B5EF4-FFF2-40B4-BE49-F238E27FC236}">
+                <a16:creationId xmlns:a16="http://schemas.microsoft.com/office/drawing/2014/main" id="{71D0644A-424B-EDF0-4F3C-A131CF68D095}"/>
+              </a:ext>
+            </a:extLst>
+          </p:cNvPr>
+          <p:cNvPicPr>
+            <a:picLocks noChangeAspect="1"/>
+          </p:cNvPicPr>
+          <p:nvPr/>
+        </p:nvPicPr>
+        <p:blipFill>
+          <a:blip r:embed="rId7">
+            <a:extLst>
+              <a:ext uri="{28A0092B-C50C-407E-A947-70E740481C1C}">
+                <a14:useLocalDpi xmlns:a14="http://schemas.microsoft.com/office/drawing/2010/main" val="0"/>
+              </a:ext>
+            </a:extLst>
+          </a:blip>
+          <a:stretch>
+            <a:fillRect/>
+          </a:stretch>
+        </p:blipFill>
+        <p:spPr>
+          <a:xfrm>
+            <a:off x="8326804" y="2718086"/>
+            <a:ext cx="3329312" cy="3329312"/>
           </a:xfrm>
           <a:prstGeom prst="rect">
             <a:avLst/>
@@ -21999,10 +22138,10 @@
       </p:sp>
       <p:sp>
         <p:nvSpPr>
-          <p:cNvPr id="2" name="ZoneTexte 9">
+          <p:cNvPr id="4" name="Rectangle 14">
             <a:extLst>
               <a:ext uri="{FF2B5EF4-FFF2-40B4-BE49-F238E27FC236}">
-                <a16:creationId xmlns:a16="http://schemas.microsoft.com/office/drawing/2014/main" id="{5B8B280F-460C-6DE5-3BEF-713C30386B8A}"/>
+                <a16:creationId xmlns:a16="http://schemas.microsoft.com/office/drawing/2014/main" id="{DB13606E-9026-960F-67D7-8E7E61FB7F30}"/>
               </a:ext>
             </a:extLst>
           </p:cNvPr>
@@ -22011,32 +22150,36 @@
         </p:nvSpPr>
         <p:spPr>
           <a:xfrm>
-            <a:off x="4161539" y="3137339"/>
-            <a:ext cx="4190676" cy="583321"/>
+            <a:off x="313199" y="1405260"/>
+            <a:ext cx="11610095" cy="4249582"/>
           </a:xfrm>
           <a:prstGeom prst="rect">
             <a:avLst/>
           </a:prstGeom>
           <a:noFill/>
-          <a:ln w="0">
-            <a:noFill/>
+          <a:ln>
+            <a:solidFill>
+              <a:srgbClr val="005E6A"/>
+            </a:solidFill>
           </a:ln>
         </p:spPr>
         <p:style>
-          <a:lnRef idx="0">
-            <a:scrgbClr r="0" g="0" b="0"/>
+          <a:lnRef idx="2">
+            <a:schemeClr val="accent1">
+              <a:shade val="15000"/>
+            </a:schemeClr>
           </a:lnRef>
-          <a:fillRef idx="0">
-            <a:scrgbClr r="0" g="0" b="0"/>
+          <a:fillRef idx="1">
+            <a:schemeClr val="accent1"/>
           </a:fillRef>
           <a:effectRef idx="0">
-            <a:scrgbClr r="0" g="0" b="0"/>
+            <a:schemeClr val="accent1"/>
           </a:effectRef>
           <a:fontRef idx="minor"/>
         </p:style>
         <p:txBody>
-          <a:bodyPr wrap="none" lIns="90000" tIns="45000" rIns="90000" bIns="45000" anchor="t">
-            <a:spAutoFit/>
+          <a:bodyPr lIns="90000" tIns="45000" rIns="90000" bIns="45000" anchor="ctr">
+            <a:noAutofit/>
           </a:bodyPr>
           <a:lstStyle/>
           <a:p>
@@ -22047,17 +22190,475 @@
               <a:buNone/>
             </a:pPr>
             <a:r>
-              <a:rPr lang="fr-FR" sz="3200" spc="-1" dirty="0">
+              <a:rPr lang="fr-FR" spc="-1" dirty="0">
                 <a:solidFill>
                   <a:srgbClr val="005E6A"/>
                 </a:solidFill>
                 <a:latin typeface="Calibri"/>
               </a:rPr>
-              <a:t>Structure du code, fct(s)</a:t>
+              <a:t>Main</a:t>
             </a:r>
-            <a:endParaRPr lang="fr-FR" sz="3200" b="0" strike="noStrike" spc="-1" dirty="0">
+          </a:p>
+          <a:p>
+            <a:pPr>
+              <a:lnSpc>
+                <a:spcPct val="100000"/>
+              </a:lnSpc>
+              <a:buNone/>
+            </a:pPr>
+            <a:endParaRPr lang="fr-FR" sz="1800" b="0" strike="noStrike" spc="-1" dirty="0">
+              <a:solidFill>
+                <a:srgbClr val="005E6A"/>
+              </a:solidFill>
+              <a:latin typeface="Calibri"/>
+            </a:endParaRPr>
+          </a:p>
+          <a:p>
+            <a:pPr>
+              <a:lnSpc>
+                <a:spcPct val="100000"/>
+              </a:lnSpc>
+              <a:buNone/>
+            </a:pPr>
+            <a:endParaRPr lang="fr-FR" spc="-1" dirty="0">
+              <a:solidFill>
+                <a:srgbClr val="005E6A"/>
+              </a:solidFill>
+              <a:latin typeface="Calibri"/>
+            </a:endParaRPr>
+          </a:p>
+          <a:p>
+            <a:pPr>
+              <a:lnSpc>
+                <a:spcPct val="100000"/>
+              </a:lnSpc>
+              <a:buNone/>
+            </a:pPr>
+            <a:endParaRPr lang="fr-FR" sz="1800" b="0" strike="noStrike" spc="-1" dirty="0">
+              <a:solidFill>
+                <a:srgbClr val="005E6A"/>
+              </a:solidFill>
+              <a:latin typeface="Calibri"/>
+            </a:endParaRPr>
+          </a:p>
+          <a:p>
+            <a:pPr>
+              <a:lnSpc>
+                <a:spcPct val="100000"/>
+              </a:lnSpc>
+              <a:buNone/>
+            </a:pPr>
+            <a:endParaRPr lang="fr-FR" spc="-1" dirty="0">
+              <a:solidFill>
+                <a:srgbClr val="005E6A"/>
+              </a:solidFill>
+              <a:latin typeface="Calibri"/>
+            </a:endParaRPr>
+          </a:p>
+          <a:p>
+            <a:pPr>
+              <a:lnSpc>
+                <a:spcPct val="100000"/>
+              </a:lnSpc>
+              <a:buNone/>
+            </a:pPr>
+            <a:endParaRPr lang="fr-FR" sz="1800" b="0" strike="noStrike" spc="-1" dirty="0">
+              <a:solidFill>
+                <a:srgbClr val="005E6A"/>
+              </a:solidFill>
+              <a:latin typeface="Calibri"/>
+            </a:endParaRPr>
+          </a:p>
+          <a:p>
+            <a:pPr>
+              <a:lnSpc>
+                <a:spcPct val="100000"/>
+              </a:lnSpc>
+              <a:buNone/>
+            </a:pPr>
+            <a:endParaRPr lang="fr-FR" spc="-1" dirty="0">
+              <a:solidFill>
+                <a:srgbClr val="005E6A"/>
+              </a:solidFill>
+              <a:latin typeface="Calibri"/>
+            </a:endParaRPr>
+          </a:p>
+          <a:p>
+            <a:pPr>
+              <a:lnSpc>
+                <a:spcPct val="100000"/>
+              </a:lnSpc>
+              <a:buNone/>
+            </a:pPr>
+            <a:endParaRPr lang="fr-FR" sz="1800" b="0" strike="noStrike" spc="-1" dirty="0">
+              <a:solidFill>
+                <a:srgbClr val="005E6A"/>
+              </a:solidFill>
+              <a:latin typeface="Calibri"/>
+            </a:endParaRPr>
+          </a:p>
+          <a:p>
+            <a:pPr>
+              <a:lnSpc>
+                <a:spcPct val="100000"/>
+              </a:lnSpc>
+              <a:buNone/>
+            </a:pPr>
+            <a:endParaRPr lang="fr-FR" spc="-1" dirty="0">
+              <a:solidFill>
+                <a:srgbClr val="005E6A"/>
+              </a:solidFill>
+              <a:latin typeface="Calibri"/>
+            </a:endParaRPr>
+          </a:p>
+          <a:p>
+            <a:pPr>
+              <a:lnSpc>
+                <a:spcPct val="100000"/>
+              </a:lnSpc>
+              <a:buNone/>
+            </a:pPr>
+            <a:endParaRPr lang="fr-FR" sz="1800" b="0" strike="noStrike" spc="-1" dirty="0">
+              <a:solidFill>
+                <a:srgbClr val="005E6A"/>
+              </a:solidFill>
+              <a:latin typeface="Calibri"/>
+            </a:endParaRPr>
+          </a:p>
+          <a:p>
+            <a:pPr>
+              <a:lnSpc>
+                <a:spcPct val="100000"/>
+              </a:lnSpc>
+              <a:buNone/>
+            </a:pPr>
+            <a:endParaRPr lang="fr-FR" spc="-1" dirty="0">
+              <a:solidFill>
+                <a:srgbClr val="005E6A"/>
+              </a:solidFill>
+              <a:latin typeface="Calibri"/>
+            </a:endParaRPr>
+          </a:p>
+          <a:p>
+            <a:pPr>
+              <a:lnSpc>
+                <a:spcPct val="100000"/>
+              </a:lnSpc>
+              <a:buNone/>
+            </a:pPr>
+            <a:endParaRPr lang="fr-FR" sz="1800" b="0" strike="noStrike" spc="-1" dirty="0">
+              <a:solidFill>
+                <a:srgbClr val="005E6A"/>
+              </a:solidFill>
+              <a:latin typeface="Calibri"/>
+            </a:endParaRPr>
+          </a:p>
+          <a:p>
+            <a:pPr>
+              <a:lnSpc>
+                <a:spcPct val="100000"/>
+              </a:lnSpc>
+              <a:buNone/>
+            </a:pPr>
+            <a:endParaRPr lang="fr-FR" spc="-1" dirty="0">
+              <a:solidFill>
+                <a:srgbClr val="005E6A"/>
+              </a:solidFill>
+              <a:latin typeface="Calibri"/>
+            </a:endParaRPr>
+          </a:p>
+          <a:p>
+            <a:pPr>
+              <a:lnSpc>
+                <a:spcPct val="100000"/>
+              </a:lnSpc>
+              <a:buNone/>
+            </a:pPr>
+            <a:endParaRPr lang="fr-FR" sz="1800" b="0" strike="noStrike" spc="-1" dirty="0">
+              <a:solidFill>
+                <a:srgbClr val="005E6A"/>
+              </a:solidFill>
+              <a:latin typeface="Calibri"/>
+            </a:endParaRPr>
+          </a:p>
+          <a:p>
+            <a:pPr>
+              <a:lnSpc>
+                <a:spcPct val="100000"/>
+              </a:lnSpc>
+              <a:buNone/>
+            </a:pPr>
+            <a:endParaRPr lang="fr-FR" sz="1800" b="0" strike="noStrike" spc="-1" dirty="0">
               <a:latin typeface="Arial"/>
             </a:endParaRPr>
+          </a:p>
+        </p:txBody>
+      </p:sp>
+      <p:sp>
+        <p:nvSpPr>
+          <p:cNvPr id="6" name="Rectangle 14">
+            <a:extLst>
+              <a:ext uri="{FF2B5EF4-FFF2-40B4-BE49-F238E27FC236}">
+                <a16:creationId xmlns:a16="http://schemas.microsoft.com/office/drawing/2014/main" id="{A66258FF-432C-51EA-2A82-FB99C13528C8}"/>
+              </a:ext>
+            </a:extLst>
+          </p:cNvPr>
+          <p:cNvSpPr/>
+          <p:nvPr/>
+        </p:nvSpPr>
+        <p:spPr>
+          <a:xfrm>
+            <a:off x="3411641" y="2175097"/>
+            <a:ext cx="1676056" cy="709863"/>
+          </a:xfrm>
+          <a:prstGeom prst="rect">
+            <a:avLst/>
+          </a:prstGeom>
+          <a:solidFill>
+            <a:schemeClr val="accent5"/>
+          </a:solidFill>
+          <a:ln>
+            <a:solidFill>
+              <a:srgbClr val="005E6A"/>
+            </a:solidFill>
+          </a:ln>
+        </p:spPr>
+        <p:style>
+          <a:lnRef idx="2">
+            <a:schemeClr val="accent1">
+              <a:shade val="15000"/>
+            </a:schemeClr>
+          </a:lnRef>
+          <a:fillRef idx="1">
+            <a:schemeClr val="accent1"/>
+          </a:fillRef>
+          <a:effectRef idx="0">
+            <a:schemeClr val="accent1"/>
+          </a:effectRef>
+          <a:fontRef idx="minor"/>
+        </p:style>
+        <p:txBody>
+          <a:bodyPr lIns="90000" tIns="45000" rIns="90000" bIns="45000" anchor="ctr">
+            <a:noAutofit/>
+          </a:bodyPr>
+          <a:lstStyle/>
+          <a:p>
+            <a:pPr>
+              <a:lnSpc>
+                <a:spcPct val="100000"/>
+              </a:lnSpc>
+              <a:buNone/>
+            </a:pPr>
+            <a:r>
+              <a:rPr lang="fr-FR" spc="-1" dirty="0">
+                <a:solidFill>
+                  <a:srgbClr val="005E6A"/>
+                </a:solidFill>
+                <a:latin typeface="Calibri"/>
+              </a:rPr>
+              <a:t>Communication</a:t>
+            </a:r>
+          </a:p>
+        </p:txBody>
+      </p:sp>
+      <p:sp>
+        <p:nvSpPr>
+          <p:cNvPr id="7" name="Rectangle 14">
+            <a:extLst>
+              <a:ext uri="{FF2B5EF4-FFF2-40B4-BE49-F238E27FC236}">
+                <a16:creationId xmlns:a16="http://schemas.microsoft.com/office/drawing/2014/main" id="{4683E651-3546-0CD3-C622-D981BCC9879E}"/>
+              </a:ext>
+            </a:extLst>
+          </p:cNvPr>
+          <p:cNvSpPr/>
+          <p:nvPr/>
+        </p:nvSpPr>
+        <p:spPr>
+          <a:xfrm>
+            <a:off x="592073" y="2175097"/>
+            <a:ext cx="1676056" cy="709863"/>
+          </a:xfrm>
+          <a:prstGeom prst="rect">
+            <a:avLst/>
+          </a:prstGeom>
+          <a:solidFill>
+            <a:schemeClr val="accent5"/>
+          </a:solidFill>
+          <a:ln>
+            <a:solidFill>
+              <a:srgbClr val="005E6A"/>
+            </a:solidFill>
+          </a:ln>
+        </p:spPr>
+        <p:style>
+          <a:lnRef idx="2">
+            <a:schemeClr val="accent1">
+              <a:shade val="15000"/>
+            </a:schemeClr>
+          </a:lnRef>
+          <a:fillRef idx="1">
+            <a:schemeClr val="accent1"/>
+          </a:fillRef>
+          <a:effectRef idx="0">
+            <a:schemeClr val="accent1"/>
+          </a:effectRef>
+          <a:fontRef idx="minor"/>
+        </p:style>
+        <p:txBody>
+          <a:bodyPr lIns="90000" tIns="45000" rIns="90000" bIns="45000" anchor="ctr">
+            <a:noAutofit/>
+          </a:bodyPr>
+          <a:lstStyle/>
+          <a:p>
+            <a:pPr>
+              <a:lnSpc>
+                <a:spcPct val="100000"/>
+              </a:lnSpc>
+              <a:buNone/>
+            </a:pPr>
+            <a:r>
+              <a:rPr lang="fr-FR" spc="-1" dirty="0">
+                <a:solidFill>
+                  <a:srgbClr val="005E6A"/>
+                </a:solidFill>
+                <a:latin typeface="Calibri"/>
+              </a:rPr>
+              <a:t>Inits</a:t>
+            </a:r>
+          </a:p>
+        </p:txBody>
+      </p:sp>
+      <p:sp>
+        <p:nvSpPr>
+          <p:cNvPr id="8" name="Rectangle 14">
+            <a:extLst>
+              <a:ext uri="{FF2B5EF4-FFF2-40B4-BE49-F238E27FC236}">
+                <a16:creationId xmlns:a16="http://schemas.microsoft.com/office/drawing/2014/main" id="{75F3842D-F6D8-778F-2415-4F2FD226172A}"/>
+              </a:ext>
+            </a:extLst>
+          </p:cNvPr>
+          <p:cNvSpPr/>
+          <p:nvPr/>
+        </p:nvSpPr>
+        <p:spPr>
+          <a:xfrm>
+            <a:off x="7178190" y="2175094"/>
+            <a:ext cx="1676056" cy="709863"/>
+          </a:xfrm>
+          <a:prstGeom prst="rect">
+            <a:avLst/>
+          </a:prstGeom>
+          <a:solidFill>
+            <a:schemeClr val="accent5"/>
+          </a:solidFill>
+          <a:ln>
+            <a:solidFill>
+              <a:srgbClr val="005E6A"/>
+            </a:solidFill>
+          </a:ln>
+        </p:spPr>
+        <p:style>
+          <a:lnRef idx="2">
+            <a:schemeClr val="accent1">
+              <a:shade val="15000"/>
+            </a:schemeClr>
+          </a:lnRef>
+          <a:fillRef idx="1">
+            <a:schemeClr val="accent1"/>
+          </a:fillRef>
+          <a:effectRef idx="0">
+            <a:schemeClr val="accent1"/>
+          </a:effectRef>
+          <a:fontRef idx="minor"/>
+        </p:style>
+        <p:txBody>
+          <a:bodyPr lIns="90000" tIns="45000" rIns="90000" bIns="45000" anchor="ctr">
+            <a:noAutofit/>
+          </a:bodyPr>
+          <a:lstStyle/>
+          <a:p>
+            <a:pPr>
+              <a:lnSpc>
+                <a:spcPct val="100000"/>
+              </a:lnSpc>
+              <a:buNone/>
+            </a:pPr>
+            <a:r>
+              <a:rPr lang="fr-FR" spc="-1" dirty="0">
+                <a:solidFill>
+                  <a:srgbClr val="005E6A"/>
+                </a:solidFill>
+                <a:latin typeface="Calibri"/>
+              </a:rPr>
+              <a:t>Lecture capteurs</a:t>
+            </a:r>
+          </a:p>
+        </p:txBody>
+      </p:sp>
+      <p:sp>
+        <p:nvSpPr>
+          <p:cNvPr id="9" name="Rectangle 14">
+            <a:extLst>
+              <a:ext uri="{FF2B5EF4-FFF2-40B4-BE49-F238E27FC236}">
+                <a16:creationId xmlns:a16="http://schemas.microsoft.com/office/drawing/2014/main" id="{2997DEA4-8ACE-B391-2B9A-9408B438B24C}"/>
+              </a:ext>
+            </a:extLst>
+          </p:cNvPr>
+          <p:cNvSpPr/>
+          <p:nvPr/>
+        </p:nvSpPr>
+        <p:spPr>
+          <a:xfrm>
+            <a:off x="5223260" y="2175095"/>
+            <a:ext cx="1676056" cy="709863"/>
+          </a:xfrm>
+          <a:prstGeom prst="rect">
+            <a:avLst/>
+          </a:prstGeom>
+          <a:solidFill>
+            <a:schemeClr val="accent5"/>
+          </a:solidFill>
+          <a:ln>
+            <a:solidFill>
+              <a:srgbClr val="005E6A"/>
+            </a:solidFill>
+          </a:ln>
+        </p:spPr>
+        <p:style>
+          <a:lnRef idx="2">
+            <a:schemeClr val="accent1">
+              <a:shade val="15000"/>
+            </a:schemeClr>
+          </a:lnRef>
+          <a:fillRef idx="1">
+            <a:schemeClr val="accent1"/>
+          </a:fillRef>
+          <a:effectRef idx="0">
+            <a:schemeClr val="accent1"/>
+          </a:effectRef>
+          <a:fontRef idx="minor"/>
+        </p:style>
+        <p:txBody>
+          <a:bodyPr lIns="90000" tIns="45000" rIns="90000" bIns="45000" anchor="ctr">
+            <a:noAutofit/>
+          </a:bodyPr>
+          <a:lstStyle/>
+          <a:p>
+            <a:pPr>
+              <a:lnSpc>
+                <a:spcPct val="100000"/>
+              </a:lnSpc>
+              <a:buNone/>
+            </a:pPr>
+            <a:r>
+              <a:rPr lang="fr-FR" spc="-1" dirty="0">
+                <a:solidFill>
+                  <a:srgbClr val="005E6A"/>
+                </a:solidFill>
+                <a:latin typeface="Calibri"/>
+              </a:rPr>
+              <a:t>Vérif moteur tourne</a:t>
+            </a:r>
           </a:p>
         </p:txBody>
       </p:sp>
@@ -22686,6 +23287,505 @@
   <p:cSld>
     <p:spTree>
       <p:nvGrpSpPr>
+        <p:cNvPr id="1" name="">
+          <a:extLst>
+            <a:ext uri="{FF2B5EF4-FFF2-40B4-BE49-F238E27FC236}">
+              <a16:creationId xmlns:a16="http://schemas.microsoft.com/office/drawing/2014/main" id="{D40F57E5-AE30-3033-9A0F-BC0C5F26E16E}"/>
+            </a:ext>
+          </a:extLst>
+        </p:cNvPr>
+        <p:cNvGrpSpPr/>
+        <p:nvPr/>
+      </p:nvGrpSpPr>
+      <p:grpSpPr>
+        <a:xfrm>
+          <a:off x="0" y="0"/>
+          <a:ext cx="0" cy="0"/>
+          <a:chOff x="0" y="0"/>
+          <a:chExt cx="0" cy="0"/>
+        </a:xfrm>
+      </p:grpSpPr>
+      <p:sp>
+        <p:nvSpPr>
+          <p:cNvPr id="305" name="PlaceHolder 1">
+            <a:extLst>
+              <a:ext uri="{FF2B5EF4-FFF2-40B4-BE49-F238E27FC236}">
+                <a16:creationId xmlns:a16="http://schemas.microsoft.com/office/drawing/2014/main" id="{1F2822BB-8FBA-8AB3-87B1-7AD46DBB6E3D}"/>
+              </a:ext>
+            </a:extLst>
+          </p:cNvPr>
+          <p:cNvSpPr>
+            <a:spLocks noGrp="1"/>
+          </p:cNvSpPr>
+          <p:nvPr>
+            <p:ph type="title"/>
+          </p:nvPr>
+        </p:nvSpPr>
+        <p:spPr>
+          <a:xfrm>
+            <a:off x="241200" y="225360"/>
+            <a:ext cx="11707560" cy="637920"/>
+          </a:xfrm>
+          <a:prstGeom prst="rect">
+            <a:avLst/>
+          </a:prstGeom>
+          <a:noFill/>
+          <a:ln w="9360">
+            <a:noFill/>
+          </a:ln>
+        </p:spPr>
+        <p:txBody>
+          <a:bodyPr numCol="1" spcCol="0" anchor="t">
+            <a:noAutofit/>
+          </a:bodyPr>
+          <a:lstStyle/>
+          <a:p>
+            <a:pPr>
+              <a:lnSpc>
+                <a:spcPct val="90000"/>
+              </a:lnSpc>
+              <a:buNone/>
+            </a:pPr>
+            <a:r>
+              <a:rPr lang="fr-FR" sz="3200" b="1" strike="noStrike" spc="-1">
+                <a:solidFill>
+                  <a:srgbClr val="005E6A"/>
+                </a:solidFill>
+                <a:latin typeface="Calibri"/>
+                <a:ea typeface="Calibri"/>
+              </a:rPr>
+              <a:t>3 – Orientations à mener pour la finalisation du projet</a:t>
+            </a:r>
+            <a:endParaRPr lang="fr-FR" sz="3200" b="0" strike="noStrike" spc="-1">
+              <a:solidFill>
+                <a:srgbClr val="2B3238"/>
+              </a:solidFill>
+              <a:latin typeface="Calibri"/>
+            </a:endParaRPr>
+          </a:p>
+        </p:txBody>
+      </p:sp>
+      <p:sp>
+        <p:nvSpPr>
+          <p:cNvPr id="306" name="Espace réservé du numéro de diapositive 4">
+            <a:extLst>
+              <a:ext uri="{FF2B5EF4-FFF2-40B4-BE49-F238E27FC236}">
+                <a16:creationId xmlns:a16="http://schemas.microsoft.com/office/drawing/2014/main" id="{B19DCC65-8A61-E3EB-FA21-518830D39A94}"/>
+              </a:ext>
+            </a:extLst>
+          </p:cNvPr>
+          <p:cNvSpPr/>
+          <p:nvPr/>
+        </p:nvSpPr>
+        <p:spPr>
+          <a:xfrm>
+            <a:off x="220680" y="6334200"/>
+            <a:ext cx="374400" cy="374400"/>
+          </a:xfrm>
+          <a:prstGeom prst="ellipse">
+            <a:avLst/>
+          </a:prstGeom>
+          <a:noFill/>
+          <a:ln w="0">
+            <a:solidFill>
+              <a:srgbClr val="005E6A"/>
+            </a:solidFill>
+          </a:ln>
+        </p:spPr>
+        <p:style>
+          <a:lnRef idx="0">
+            <a:scrgbClr r="0" g="0" b="0"/>
+          </a:lnRef>
+          <a:fillRef idx="0">
+            <a:scrgbClr r="0" g="0" b="0"/>
+          </a:fillRef>
+          <a:effectRef idx="0">
+            <a:scrgbClr r="0" g="0" b="0"/>
+          </a:effectRef>
+          <a:fontRef idx="minor"/>
+        </p:style>
+        <p:txBody>
+          <a:bodyPr numCol="1" spcCol="0" anchor="t">
+            <a:noAutofit/>
+          </a:bodyPr>
+          <a:lstStyle/>
+          <a:p>
+            <a:pPr algn="ctr">
+              <a:lnSpc>
+                <a:spcPct val="100000"/>
+              </a:lnSpc>
+              <a:buNone/>
+            </a:pPr>
+            <a:fld id="{84C4C227-C5A9-42A2-A5AD-AD432B0D3890}" type="slidenum">
+              <a:rPr lang="fr-FR" sz="900" b="0" strike="noStrike" spc="-1">
+                <a:solidFill>
+                  <a:srgbClr val="005E6A"/>
+                </a:solidFill>
+                <a:latin typeface="Segoe UI"/>
+              </a:rPr>
+              <a:t>15</a:t>
+            </a:fld>
+            <a:endParaRPr lang="fr-FR" sz="900" b="0" strike="noStrike" spc="-1">
+              <a:latin typeface="Arial"/>
+            </a:endParaRPr>
+          </a:p>
+        </p:txBody>
+      </p:sp>
+      <p:sp>
+        <p:nvSpPr>
+          <p:cNvPr id="307" name="PlaceHolder 2">
+            <a:extLst>
+              <a:ext uri="{FF2B5EF4-FFF2-40B4-BE49-F238E27FC236}">
+                <a16:creationId xmlns:a16="http://schemas.microsoft.com/office/drawing/2014/main" id="{0877882D-9FA6-F38F-8127-946028FA320C}"/>
+              </a:ext>
+            </a:extLst>
+          </p:cNvPr>
+          <p:cNvSpPr>
+            <a:spLocks noGrp="1"/>
+          </p:cNvSpPr>
+          <p:nvPr>
+            <p:ph type="dt" idx="23"/>
+          </p:nvPr>
+        </p:nvSpPr>
+        <p:spPr>
+          <a:xfrm>
+            <a:off x="939960" y="6334200"/>
+            <a:ext cx="952200" cy="364680"/>
+          </a:xfrm>
+          <a:prstGeom prst="rect">
+            <a:avLst/>
+          </a:prstGeom>
+          <a:noFill/>
+          <a:ln w="0">
+            <a:noFill/>
+          </a:ln>
+        </p:spPr>
+        <p:txBody>
+          <a:bodyPr anchor="ctr">
+            <a:noAutofit/>
+          </a:bodyPr>
+          <a:lstStyle>
+            <a:lvl1pPr>
+              <a:lnSpc>
+                <a:spcPct val="100000"/>
+              </a:lnSpc>
+              <a:buNone/>
+              <a:defRPr lang="fr-FR" sz="1200" b="0" strike="noStrike" spc="-1">
+                <a:solidFill>
+                  <a:srgbClr val="F4F4F4"/>
+                </a:solidFill>
+                <a:latin typeface="Calibri"/>
+              </a:defRPr>
+            </a:lvl1pPr>
+          </a:lstStyle>
+          <a:p>
+            <a:pPr>
+              <a:lnSpc>
+                <a:spcPct val="100000"/>
+              </a:lnSpc>
+              <a:buNone/>
+            </a:pPr>
+            <a:r>
+              <a:rPr lang="fr-FR" sz="1200" b="0" strike="noStrike" spc="-1">
+                <a:solidFill>
+                  <a:srgbClr val="F4F4F4"/>
+                </a:solidFill>
+                <a:latin typeface="Calibri"/>
+              </a:rPr>
+              <a:t>14/12/2023</a:t>
+            </a:r>
+            <a:endParaRPr lang="fr-FR" sz="1200" b="0" strike="noStrike" spc="-1">
+              <a:latin typeface="Times New Roman"/>
+            </a:endParaRPr>
+          </a:p>
+        </p:txBody>
+      </p:sp>
+      <p:sp>
+        <p:nvSpPr>
+          <p:cNvPr id="308" name="Titre 1">
+            <a:extLst>
+              <a:ext uri="{FF2B5EF4-FFF2-40B4-BE49-F238E27FC236}">
+                <a16:creationId xmlns:a16="http://schemas.microsoft.com/office/drawing/2014/main" id="{3F2967EB-1613-CDCC-C7A3-745DE8462724}"/>
+              </a:ext>
+            </a:extLst>
+          </p:cNvPr>
+          <p:cNvSpPr/>
+          <p:nvPr/>
+        </p:nvSpPr>
+        <p:spPr>
+          <a:xfrm>
+            <a:off x="484200" y="673560"/>
+            <a:ext cx="6215760" cy="607320"/>
+          </a:xfrm>
+          <a:prstGeom prst="rect">
+            <a:avLst/>
+          </a:prstGeom>
+          <a:noFill/>
+          <a:ln w="9525">
+            <a:noFill/>
+          </a:ln>
+        </p:spPr>
+        <p:style>
+          <a:lnRef idx="0">
+            <a:scrgbClr r="0" g="0" b="0"/>
+          </a:lnRef>
+          <a:fillRef idx="0">
+            <a:scrgbClr r="0" g="0" b="0"/>
+          </a:fillRef>
+          <a:effectRef idx="0">
+            <a:scrgbClr r="0" g="0" b="0"/>
+          </a:effectRef>
+          <a:fontRef idx="minor"/>
+        </p:style>
+        <p:txBody>
+          <a:bodyPr numCol="1" spcCol="0" anchor="t">
+            <a:noAutofit/>
+          </a:bodyPr>
+          <a:lstStyle/>
+          <a:p>
+            <a:pPr marL="343080" indent="-343080">
+              <a:lnSpc>
+                <a:spcPct val="107000"/>
+              </a:lnSpc>
+              <a:buClr>
+                <a:srgbClr val="005E6A"/>
+              </a:buClr>
+              <a:buFont typeface="Wingdings" charset="2"/>
+              <a:buChar char=""/>
+            </a:pPr>
+            <a:r>
+              <a:rPr lang="fr-FR" sz="2000" b="1" strike="noStrike" spc="-1">
+                <a:solidFill>
+                  <a:srgbClr val="005E6A"/>
+                </a:solidFill>
+                <a:latin typeface="Calibri"/>
+                <a:ea typeface="Calibri"/>
+              </a:rPr>
+              <a:t>Etude de l’architecture ARM du STM32</a:t>
+            </a:r>
+            <a:endParaRPr lang="fr-FR" sz="2000" b="0" strike="noStrike" spc="-1">
+              <a:latin typeface="Arial"/>
+            </a:endParaRPr>
+          </a:p>
+        </p:txBody>
+      </p:sp>
+      <p:sp>
+        <p:nvSpPr>
+          <p:cNvPr id="310" name="ZoneTexte 10">
+            <a:extLst>
+              <a:ext uri="{FF2B5EF4-FFF2-40B4-BE49-F238E27FC236}">
+                <a16:creationId xmlns:a16="http://schemas.microsoft.com/office/drawing/2014/main" id="{F6E87C7D-5001-BC0F-57C2-27BD8A114293}"/>
+              </a:ext>
+            </a:extLst>
+          </p:cNvPr>
+          <p:cNvSpPr/>
+          <p:nvPr/>
+        </p:nvSpPr>
+        <p:spPr>
+          <a:xfrm>
+            <a:off x="2196508" y="2242566"/>
+            <a:ext cx="5727240" cy="2154329"/>
+          </a:xfrm>
+          <a:prstGeom prst="rect">
+            <a:avLst/>
+          </a:prstGeom>
+          <a:noFill/>
+          <a:ln w="0">
+            <a:noFill/>
+          </a:ln>
+        </p:spPr>
+        <p:style>
+          <a:lnRef idx="0">
+            <a:scrgbClr r="0" g="0" b="0"/>
+          </a:lnRef>
+          <a:fillRef idx="0">
+            <a:scrgbClr r="0" g="0" b="0"/>
+          </a:fillRef>
+          <a:effectRef idx="0">
+            <a:scrgbClr r="0" g="0" b="0"/>
+          </a:effectRef>
+          <a:fontRef idx="minor"/>
+        </p:style>
+        <p:txBody>
+          <a:bodyPr lIns="90000" tIns="45000" rIns="90000" bIns="45000" anchor="t">
+            <a:spAutoFit/>
+          </a:bodyPr>
+          <a:lstStyle/>
+          <a:p>
+            <a:pPr>
+              <a:lnSpc>
+                <a:spcPct val="107000"/>
+              </a:lnSpc>
+              <a:spcAft>
+                <a:spcPts val="799"/>
+              </a:spcAft>
+              <a:buNone/>
+            </a:pPr>
+            <a:r>
+              <a:rPr lang="fr-FR" sz="2400" b="1" strike="noStrike" spc="-1" dirty="0">
+                <a:solidFill>
+                  <a:srgbClr val="005E6A"/>
+                </a:solidFill>
+                <a:latin typeface="Calibri"/>
+                <a:ea typeface="Calibri"/>
+              </a:rPr>
+              <a:t>3 – Orientations à mener pour la finalisation du projet</a:t>
+            </a:r>
+            <a:endParaRPr lang="fr-FR" sz="2400" b="0" strike="noStrike" spc="-1" dirty="0">
+              <a:latin typeface="Arial"/>
+            </a:endParaRPr>
+          </a:p>
+          <a:p>
+            <a:pPr marL="343080" indent="-343080">
+              <a:lnSpc>
+                <a:spcPct val="107000"/>
+              </a:lnSpc>
+              <a:buClr>
+                <a:srgbClr val="005E6A"/>
+              </a:buClr>
+              <a:buFont typeface="Symbol"/>
+              <a:buChar char=""/>
+            </a:pPr>
+            <a:r>
+              <a:rPr lang="fr-FR" sz="1800" b="0" strike="noStrike" spc="-1" dirty="0">
+                <a:solidFill>
+                  <a:srgbClr val="005E6A"/>
+                </a:solidFill>
+                <a:latin typeface="Calibri"/>
+                <a:ea typeface="Calibri"/>
+              </a:rPr>
+              <a:t>Programmation(s)</a:t>
+            </a:r>
+          </a:p>
+          <a:p>
+            <a:pPr marL="343080" indent="-343080">
+              <a:lnSpc>
+                <a:spcPct val="107000"/>
+              </a:lnSpc>
+              <a:buClr>
+                <a:srgbClr val="005E6A"/>
+              </a:buClr>
+              <a:buFont typeface="Symbol"/>
+              <a:buChar char=""/>
+            </a:pPr>
+            <a:r>
+              <a:rPr lang="fr-FR" sz="1800" spc="-1" dirty="0">
+                <a:solidFill>
+                  <a:srgbClr val="005E6A"/>
+                </a:solidFill>
+                <a:latin typeface="Calibri"/>
+                <a:ea typeface="Calibri"/>
+              </a:rPr>
+              <a:t>Essais sur maquette</a:t>
+            </a:r>
+          </a:p>
+          <a:p>
+            <a:pPr marL="343080" indent="-343080">
+              <a:lnSpc>
+                <a:spcPct val="107000"/>
+              </a:lnSpc>
+              <a:buClr>
+                <a:srgbClr val="005E6A"/>
+              </a:buClr>
+              <a:buFont typeface="Symbol"/>
+              <a:buChar char=""/>
+            </a:pPr>
+            <a:r>
+              <a:rPr lang="fr-FR" sz="1800" b="0" strike="noStrike" spc="-1" dirty="0">
+                <a:solidFill>
+                  <a:srgbClr val="005E6A"/>
+                </a:solidFill>
+                <a:latin typeface="Calibri"/>
+                <a:ea typeface="Calibri"/>
+              </a:rPr>
+              <a:t>Essais réels (parler données réel </a:t>
+            </a:r>
+            <a:r>
+              <a:rPr lang="fr-FR" sz="1800" b="0" strike="noStrike" spc="-1" dirty="0" err="1">
+                <a:solidFill>
+                  <a:srgbClr val="005E6A"/>
+                </a:solidFill>
+                <a:latin typeface="Calibri"/>
+                <a:ea typeface="Calibri"/>
+              </a:rPr>
+              <a:t>recup</a:t>
+            </a:r>
+            <a:r>
+              <a:rPr lang="fr-FR" sz="1800" b="0" strike="noStrike" spc="-1" dirty="0">
+                <a:solidFill>
+                  <a:srgbClr val="005E6A"/>
+                </a:solidFill>
+                <a:latin typeface="Calibri"/>
+                <a:ea typeface="Calibri"/>
+              </a:rPr>
+              <a:t> sur </a:t>
+            </a:r>
+            <a:r>
+              <a:rPr lang="fr-FR" sz="1800" b="0" strike="noStrike" spc="-1" dirty="0" err="1">
+                <a:solidFill>
+                  <a:srgbClr val="005E6A"/>
+                </a:solidFill>
+                <a:latin typeface="Calibri"/>
+                <a:ea typeface="Calibri"/>
+              </a:rPr>
+              <a:t>vehicule</a:t>
+            </a:r>
+            <a:r>
+              <a:rPr lang="fr-FR" sz="1800" b="0" strike="noStrike" spc="-1" dirty="0">
+                <a:solidFill>
+                  <a:srgbClr val="005E6A"/>
+                </a:solidFill>
+                <a:latin typeface="Calibri"/>
+                <a:ea typeface="Calibri"/>
+              </a:rPr>
+              <a:t>)</a:t>
+            </a:r>
+          </a:p>
+          <a:p>
+            <a:pPr marL="343080" indent="-343080">
+              <a:lnSpc>
+                <a:spcPct val="107000"/>
+              </a:lnSpc>
+              <a:buClr>
+                <a:srgbClr val="005E6A"/>
+              </a:buClr>
+              <a:buFont typeface="Symbol"/>
+              <a:buChar char=""/>
+            </a:pPr>
+            <a:r>
+              <a:rPr lang="fr-FR" sz="1800" spc="-1" dirty="0">
+                <a:solidFill>
+                  <a:srgbClr val="005E6A"/>
+                </a:solidFill>
+                <a:latin typeface="Calibri"/>
+                <a:ea typeface="Calibri"/>
+              </a:rPr>
+              <a:t>Optimisation(s)</a:t>
+            </a:r>
+            <a:endParaRPr lang="fr-FR" sz="1800" b="0" strike="noStrike" spc="-1" dirty="0">
+              <a:latin typeface="Arial"/>
+            </a:endParaRPr>
+          </a:p>
+        </p:txBody>
+      </p:sp>
+    </p:spTree>
+    <p:extLst>
+      <p:ext uri="{BB962C8B-B14F-4D97-AF65-F5344CB8AC3E}">
+        <p14:creationId xmlns:p14="http://schemas.microsoft.com/office/powerpoint/2010/main" val="1179297282"/>
+      </p:ext>
+    </p:extLst>
+  </p:cSld>
+  <p:clrMapOvr>
+    <a:masterClrMapping/>
+  </p:clrMapOvr>
+</p:sld>
+</file>
+
+<file path=ppt/slides/slide16.xml><?xml version="1.0" encoding="utf-8"?>
+<p:sld xmlns:a="http://schemas.openxmlformats.org/drawingml/2006/main" xmlns:r="http://schemas.openxmlformats.org/officeDocument/2006/relationships" xmlns:p="http://schemas.openxmlformats.org/presentationml/2006/main">
+  <p:cSld>
+    <p:spTree>
+      <p:nvGrpSpPr>
         <p:cNvPr id="1" name=""/>
         <p:cNvGrpSpPr/>
         <p:nvPr/>
@@ -22804,7 +23904,7 @@
                 </a:solidFill>
                 <a:latin typeface="Segoe UI"/>
               </a:rPr>
-              <a:t>15</a:t>
+              <a:t>16</a:t>
             </a:fld>
             <a:endParaRPr lang="fr-FR" sz="900" b="0" strike="noStrike" spc="-1">
               <a:latin typeface="Arial"/>
@@ -22906,7 +24006,7 @@
 </p:sld>
 </file>
 
-<file path=ppt/slides/slide16.xml><?xml version="1.0" encoding="utf-8"?>
+<file path=ppt/slides/slide17.xml><?xml version="1.0" encoding="utf-8"?>
 <p:sld xmlns:a="http://schemas.openxmlformats.org/drawingml/2006/main" xmlns:r="http://schemas.openxmlformats.org/officeDocument/2006/relationships" xmlns:p="http://schemas.openxmlformats.org/presentationml/2006/main">
   <p:cSld>
     <p:spTree>
@@ -23028,7 +24128,7 @@
                 </a:solidFill>
                 <a:latin typeface="Segoe UI"/>
               </a:rPr>
-              <a:t>16</a:t>
+              <a:t>17</a:t>
             </a:fld>
             <a:endParaRPr lang="fr-FR" sz="900" b="0" strike="noStrike" spc="-1">
               <a:latin typeface="Arial"/>
@@ -24032,7 +25132,7 @@
               <a:buChar char=""/>
             </a:pPr>
             <a:r>
-              <a:rPr lang="fr-FR" sz="2000" b="1" strike="noStrike" spc="-1">
+              <a:rPr lang="fr-FR" sz="2000" b="1" strike="noStrike" spc="-1" dirty="0">
                 <a:solidFill>
                   <a:srgbClr val="005E6A"/>
                 </a:solidFill>
@@ -24040,7 +25140,7 @@
               </a:rPr>
               <a:t>Concevoir et Assembler un Calculateur Moteur :</a:t>
             </a:r>
-            <a:endParaRPr lang="fr-FR" sz="2000" b="0" strike="noStrike" spc="-1">
+            <a:endParaRPr lang="fr-FR" sz="2000" b="0" strike="noStrike" spc="-1" dirty="0">
               <a:latin typeface="Arial"/>
             </a:endParaRPr>
           </a:p>
@@ -24056,7 +25156,7 @@
               <a:buChar char="•"/>
             </a:pPr>
             <a:r>
-              <a:rPr lang="fr-FR" sz="2000" b="0" strike="noStrike" spc="-1">
+              <a:rPr lang="fr-FR" sz="2000" b="0" strike="noStrike" spc="-1" dirty="0">
                 <a:solidFill>
                   <a:srgbClr val="005E6A"/>
                 </a:solidFill>
@@ -24064,7 +25164,7 @@
               </a:rPr>
               <a:t>Acquérir une compréhension approfondie du moteur thermique essence.</a:t>
             </a:r>
-            <a:endParaRPr lang="fr-FR" sz="2000" b="0" strike="noStrike" spc="-1">
+            <a:endParaRPr lang="fr-FR" sz="2000" b="0" strike="noStrike" spc="-1" dirty="0">
               <a:latin typeface="Arial"/>
             </a:endParaRPr>
           </a:p>
@@ -24080,7 +25180,7 @@
               <a:buChar char="•"/>
             </a:pPr>
             <a:r>
-              <a:rPr lang="fr-FR" sz="2000" b="0" strike="noStrike" spc="-1">
+              <a:rPr lang="fr-FR" sz="2000" b="0" strike="noStrike" spc="-1" dirty="0">
                 <a:solidFill>
                   <a:srgbClr val="005E6A"/>
                 </a:solidFill>
@@ -24088,7 +25188,7 @@
               </a:rPr>
               <a:t>Concevoir et assembler un calculateur moteur utilisant un microcontrôleur STM32.</a:t>
             </a:r>
-            <a:endParaRPr lang="fr-FR" sz="2000" b="0" strike="noStrike" spc="-1">
+            <a:endParaRPr lang="fr-FR" sz="2000" b="0" strike="noStrike" spc="-1" dirty="0">
               <a:latin typeface="Arial"/>
             </a:endParaRPr>
           </a:p>
@@ -24099,7 +25199,7 @@
               </a:lnSpc>
               <a:buNone/>
             </a:pPr>
-            <a:endParaRPr lang="fr-FR" sz="2000" b="0" strike="noStrike" spc="-1">
+            <a:endParaRPr lang="fr-FR" sz="2000" b="0" strike="noStrike" spc="-1" dirty="0">
               <a:latin typeface="Arial"/>
             </a:endParaRPr>
           </a:p>
@@ -24115,7 +25215,7 @@
               <a:buChar char=""/>
             </a:pPr>
             <a:r>
-              <a:rPr lang="fr-FR" sz="2000" b="1" strike="noStrike" spc="-1">
+              <a:rPr lang="fr-FR" sz="2000" b="1" strike="noStrike" spc="-1" dirty="0">
                 <a:solidFill>
                   <a:srgbClr val="005E6A"/>
                 </a:solidFill>
@@ -24123,7 +25223,7 @@
               </a:rPr>
               <a:t>Développer et Tester le Programme de Gestion Moteur :</a:t>
             </a:r>
-            <a:endParaRPr lang="fr-FR" sz="2000" b="0" strike="noStrike" spc="-1">
+            <a:endParaRPr lang="fr-FR" sz="2000" b="0" strike="noStrike" spc="-1" dirty="0">
               <a:latin typeface="Arial"/>
             </a:endParaRPr>
           </a:p>
@@ -24139,7 +25239,7 @@
               <a:buChar char="•"/>
             </a:pPr>
             <a:r>
-              <a:rPr lang="fr-FR" sz="2000" b="0" strike="noStrike" spc="-1">
+              <a:rPr lang="fr-FR" sz="2000" b="0" strike="noStrike" spc="-1" dirty="0">
                 <a:solidFill>
                   <a:srgbClr val="005E6A"/>
                 </a:solidFill>
@@ -24147,7 +25247,7 @@
               </a:rPr>
               <a:t>Élaborer le programme de gestion moteur pour le calculateur.</a:t>
             </a:r>
-            <a:endParaRPr lang="fr-FR" sz="2000" b="0" strike="noStrike" spc="-1">
+            <a:endParaRPr lang="fr-FR" sz="2000" b="0" strike="noStrike" spc="-1" dirty="0">
               <a:latin typeface="Arial"/>
             </a:endParaRPr>
           </a:p>
@@ -24163,7 +25263,7 @@
               <a:buChar char="•"/>
             </a:pPr>
             <a:r>
-              <a:rPr lang="fr-FR" sz="2000" b="0" strike="noStrike" spc="-1">
+              <a:rPr lang="fr-FR" sz="2000" b="0" strike="noStrike" spc="-1" dirty="0">
                 <a:solidFill>
                   <a:srgbClr val="005E6A"/>
                 </a:solidFill>
@@ -24171,7 +25271,7 @@
               </a:rPr>
               <a:t>Effectuer des tests approfondis pour garantir le bon fonctionnement et l'adaptation aux besoins du projet.</a:t>
             </a:r>
-            <a:endParaRPr lang="fr-FR" sz="2000" b="0" strike="noStrike" spc="-1">
+            <a:endParaRPr lang="fr-FR" sz="2000" b="0" strike="noStrike" spc="-1" dirty="0">
               <a:latin typeface="Arial"/>
             </a:endParaRPr>
           </a:p>
@@ -24187,7 +25287,7 @@
               <a:buChar char="•"/>
             </a:pPr>
             <a:r>
-              <a:rPr lang="fr-FR" sz="2000" b="0" strike="noStrike" spc="-1">
+              <a:rPr lang="fr-FR" sz="2000" b="0" strike="noStrike" spc="-1" dirty="0">
                 <a:solidFill>
                   <a:srgbClr val="005E6A"/>
                 </a:solidFill>
@@ -24195,7 +25295,7 @@
               </a:rPr>
               <a:t>Développer un logiciel PC permettant le suivi en temps réel et la modification des données du calculateur.</a:t>
             </a:r>
-            <a:endParaRPr lang="fr-FR" sz="2000" b="0" strike="noStrike" spc="-1">
+            <a:endParaRPr lang="fr-FR" sz="2000" b="0" strike="noStrike" spc="-1" dirty="0">
               <a:latin typeface="Arial"/>
             </a:endParaRPr>
           </a:p>
@@ -24206,7 +25306,7 @@
               </a:lnSpc>
               <a:buNone/>
             </a:pPr>
-            <a:endParaRPr lang="fr-FR" sz="2000" b="0" strike="noStrike" spc="-1">
+            <a:endParaRPr lang="fr-FR" sz="2000" b="0" strike="noStrike" spc="-1" dirty="0">
               <a:latin typeface="Arial"/>
             </a:endParaRPr>
           </a:p>
@@ -24222,7 +25322,7 @@
               <a:buChar char=""/>
             </a:pPr>
             <a:r>
-              <a:rPr lang="fr-FR" sz="2000" b="1" strike="noStrike" spc="-1">
+              <a:rPr lang="fr-FR" sz="2000" b="1" strike="noStrike" spc="-1" dirty="0">
                 <a:solidFill>
                   <a:srgbClr val="005E6A"/>
                 </a:solidFill>
@@ -24230,7 +25330,7 @@
               </a:rPr>
               <a:t>Intégration et Suivi avec GitHub :</a:t>
             </a:r>
-            <a:endParaRPr lang="fr-FR" sz="2000" b="0" strike="noStrike" spc="-1">
+            <a:endParaRPr lang="fr-FR" sz="2000" b="0" strike="noStrike" spc="-1" dirty="0">
               <a:latin typeface="Arial"/>
             </a:endParaRPr>
           </a:p>
@@ -24246,7 +25346,7 @@
               <a:buChar char="•"/>
             </a:pPr>
             <a:r>
-              <a:rPr lang="fr-FR" sz="2000" b="0" strike="noStrike" spc="-1">
+              <a:rPr lang="fr-FR" sz="2000" b="0" strike="noStrike" spc="-1" dirty="0">
                 <a:solidFill>
                   <a:srgbClr val="005E6A"/>
                 </a:solidFill>
@@ -24254,7 +25354,7 @@
               </a:rPr>
               <a:t>Utiliser GitHub comme plateforme de gestion de projet pour favoriser la collaboration, la traçabilité et la gestion des versions.</a:t>
             </a:r>
-            <a:endParaRPr lang="fr-FR" sz="2000" b="0" strike="noStrike" spc="-1">
+            <a:endParaRPr lang="fr-FR" sz="2000" b="0" strike="noStrike" spc="-1" dirty="0">
               <a:latin typeface="Arial"/>
             </a:endParaRPr>
           </a:p>

</xml_diff>